<commit_message>
added cities and mission boards
</commit_message>
<xml_diff>
--- a/Galaxy_Business-master/GalaxyBusiness/Space Merchant.pptx
+++ b/Galaxy_Business-master/GalaxyBusiness/Space Merchant.pptx
@@ -265,7 +265,7 @@
           <a:p>
             <a:fld id="{CBD5BFB6-D87F-42FC-8428-4A49F1E78D0E}" type="datetimeFigureOut">
               <a:rPr lang="en-US" smtClean="0"/>
-              <a:t>8/4/2020</a:t>
+              <a:t>8/5/2020</a:t>
             </a:fld>
             <a:endParaRPr lang="en-US"/>
           </a:p>
@@ -463,7 +463,7 @@
           <a:p>
             <a:fld id="{CBD5BFB6-D87F-42FC-8428-4A49F1E78D0E}" type="datetimeFigureOut">
               <a:rPr lang="en-US" smtClean="0"/>
-              <a:t>8/4/2020</a:t>
+              <a:t>8/5/2020</a:t>
             </a:fld>
             <a:endParaRPr lang="en-US"/>
           </a:p>
@@ -671,7 +671,7 @@
           <a:p>
             <a:fld id="{CBD5BFB6-D87F-42FC-8428-4A49F1E78D0E}" type="datetimeFigureOut">
               <a:rPr lang="en-US" smtClean="0"/>
-              <a:t>8/4/2020</a:t>
+              <a:t>8/5/2020</a:t>
             </a:fld>
             <a:endParaRPr lang="en-US"/>
           </a:p>
@@ -869,7 +869,7 @@
           <a:p>
             <a:fld id="{CBD5BFB6-D87F-42FC-8428-4A49F1E78D0E}" type="datetimeFigureOut">
               <a:rPr lang="en-US" smtClean="0"/>
-              <a:t>8/4/2020</a:t>
+              <a:t>8/5/2020</a:t>
             </a:fld>
             <a:endParaRPr lang="en-US"/>
           </a:p>
@@ -1144,7 +1144,7 @@
           <a:p>
             <a:fld id="{CBD5BFB6-D87F-42FC-8428-4A49F1E78D0E}" type="datetimeFigureOut">
               <a:rPr lang="en-US" smtClean="0"/>
-              <a:t>8/4/2020</a:t>
+              <a:t>8/5/2020</a:t>
             </a:fld>
             <a:endParaRPr lang="en-US"/>
           </a:p>
@@ -1409,7 +1409,7 @@
           <a:p>
             <a:fld id="{CBD5BFB6-D87F-42FC-8428-4A49F1E78D0E}" type="datetimeFigureOut">
               <a:rPr lang="en-US" smtClean="0"/>
-              <a:t>8/4/2020</a:t>
+              <a:t>8/5/2020</a:t>
             </a:fld>
             <a:endParaRPr lang="en-US"/>
           </a:p>
@@ -1821,7 +1821,7 @@
           <a:p>
             <a:fld id="{CBD5BFB6-D87F-42FC-8428-4A49F1E78D0E}" type="datetimeFigureOut">
               <a:rPr lang="en-US" smtClean="0"/>
-              <a:t>8/4/2020</a:t>
+              <a:t>8/5/2020</a:t>
             </a:fld>
             <a:endParaRPr lang="en-US"/>
           </a:p>
@@ -1962,7 +1962,7 @@
           <a:p>
             <a:fld id="{CBD5BFB6-D87F-42FC-8428-4A49F1E78D0E}" type="datetimeFigureOut">
               <a:rPr lang="en-US" smtClean="0"/>
-              <a:t>8/4/2020</a:t>
+              <a:t>8/5/2020</a:t>
             </a:fld>
             <a:endParaRPr lang="en-US"/>
           </a:p>
@@ -2075,7 +2075,7 @@
           <a:p>
             <a:fld id="{CBD5BFB6-D87F-42FC-8428-4A49F1E78D0E}" type="datetimeFigureOut">
               <a:rPr lang="en-US" smtClean="0"/>
-              <a:t>8/4/2020</a:t>
+              <a:t>8/5/2020</a:t>
             </a:fld>
             <a:endParaRPr lang="en-US"/>
           </a:p>
@@ -2386,7 +2386,7 @@
           <a:p>
             <a:fld id="{CBD5BFB6-D87F-42FC-8428-4A49F1E78D0E}" type="datetimeFigureOut">
               <a:rPr lang="en-US" smtClean="0"/>
-              <a:t>8/4/2020</a:t>
+              <a:t>8/5/2020</a:t>
             </a:fld>
             <a:endParaRPr lang="en-US"/>
           </a:p>
@@ -2674,7 +2674,7 @@
           <a:p>
             <a:fld id="{CBD5BFB6-D87F-42FC-8428-4A49F1E78D0E}" type="datetimeFigureOut">
               <a:rPr lang="en-US" smtClean="0"/>
-              <a:t>8/4/2020</a:t>
+              <a:t>8/5/2020</a:t>
             </a:fld>
             <a:endParaRPr lang="en-US"/>
           </a:p>
@@ -2915,7 +2915,7 @@
           <a:p>
             <a:fld id="{CBD5BFB6-D87F-42FC-8428-4A49F1E78D0E}" type="datetimeFigureOut">
               <a:rPr lang="en-US" smtClean="0"/>
-              <a:t>8/4/2020</a:t>
+              <a:t>8/5/2020</a:t>
             </a:fld>
             <a:endParaRPr lang="en-US"/>
           </a:p>
@@ -3639,6 +3639,14 @@
               <a:rPr lang="en-US" dirty="0" err="1"/>
               <a:t>Natotis</a:t>
             </a:r>
+            <a:r>
+              <a:rPr lang="en-US" dirty="0"/>
+              <a:t> -</a:t>
+            </a:r>
+            <a:r>
+              <a:rPr lang="en-US" dirty="0" err="1"/>
+              <a:t>Zhul</a:t>
+            </a:r>
             <a:endParaRPr lang="en-US" dirty="0"/>
           </a:p>
           <a:p>
@@ -3734,6 +3742,14 @@
               <a:rPr lang="en-US" sz="2800" dirty="0" err="1"/>
               <a:t>Otov</a:t>
             </a:r>
+            <a:r>
+              <a:rPr lang="en-US" sz="2800" dirty="0"/>
+              <a:t>- </a:t>
+            </a:r>
+            <a:r>
+              <a:rPr lang="en-US" sz="2800" dirty="0" err="1"/>
+              <a:t>Xigow</a:t>
+            </a:r>
             <a:endParaRPr lang="en-US" sz="2800" dirty="0"/>
           </a:p>
           <a:p>
@@ -3741,7 +3757,10 @@
               <a:rPr lang="en-US" sz="2800" dirty="0" err="1"/>
               <a:t>Larvis</a:t>
             </a:r>
-            <a:endParaRPr lang="en-US" sz="2800" dirty="0"/>
+            <a:r>
+              <a:rPr lang="en-US" sz="2800" dirty="0"/>
+              <a:t>-</a:t>
+            </a:r>
           </a:p>
           <a:p>
             <a:endParaRPr lang="en-US" dirty="0"/>

</xml_diff>

<commit_message>
added new mission for natotis
</commit_message>
<xml_diff>
--- a/Galaxy_Business-master/GalaxyBusiness/Space Merchant.pptx
+++ b/Galaxy_Business-master/GalaxyBusiness/Space Merchant.pptx
@@ -11,7 +11,10 @@
     <p:sldId id="259" r:id="rId5"/>
     <p:sldId id="260" r:id="rId6"/>
     <p:sldId id="262" r:id="rId7"/>
-    <p:sldId id="261" r:id="rId8"/>
+    <p:sldId id="263" r:id="rId8"/>
+    <p:sldId id="264" r:id="rId9"/>
+    <p:sldId id="265" r:id="rId10"/>
+    <p:sldId id="261" r:id="rId11"/>
   </p:sldIdLst>
   <p:sldSz cx="12192000" cy="6858000"/>
   <p:notesSz cx="6858000" cy="9144000"/>
@@ -265,7 +268,7 @@
           <a:p>
             <a:fld id="{CBD5BFB6-D87F-42FC-8428-4A49F1E78D0E}" type="datetimeFigureOut">
               <a:rPr lang="en-US" smtClean="0"/>
-              <a:t>8/5/2020</a:t>
+              <a:t>8/8/2020</a:t>
             </a:fld>
             <a:endParaRPr lang="en-US"/>
           </a:p>
@@ -463,7 +466,7 @@
           <a:p>
             <a:fld id="{CBD5BFB6-D87F-42FC-8428-4A49F1E78D0E}" type="datetimeFigureOut">
               <a:rPr lang="en-US" smtClean="0"/>
-              <a:t>8/5/2020</a:t>
+              <a:t>8/8/2020</a:t>
             </a:fld>
             <a:endParaRPr lang="en-US"/>
           </a:p>
@@ -671,7 +674,7 @@
           <a:p>
             <a:fld id="{CBD5BFB6-D87F-42FC-8428-4A49F1E78D0E}" type="datetimeFigureOut">
               <a:rPr lang="en-US" smtClean="0"/>
-              <a:t>8/5/2020</a:t>
+              <a:t>8/8/2020</a:t>
             </a:fld>
             <a:endParaRPr lang="en-US"/>
           </a:p>
@@ -869,7 +872,7 @@
           <a:p>
             <a:fld id="{CBD5BFB6-D87F-42FC-8428-4A49F1E78D0E}" type="datetimeFigureOut">
               <a:rPr lang="en-US" smtClean="0"/>
-              <a:t>8/5/2020</a:t>
+              <a:t>8/8/2020</a:t>
             </a:fld>
             <a:endParaRPr lang="en-US"/>
           </a:p>
@@ -1144,7 +1147,7 @@
           <a:p>
             <a:fld id="{CBD5BFB6-D87F-42FC-8428-4A49F1E78D0E}" type="datetimeFigureOut">
               <a:rPr lang="en-US" smtClean="0"/>
-              <a:t>8/5/2020</a:t>
+              <a:t>8/8/2020</a:t>
             </a:fld>
             <a:endParaRPr lang="en-US"/>
           </a:p>
@@ -1409,7 +1412,7 @@
           <a:p>
             <a:fld id="{CBD5BFB6-D87F-42FC-8428-4A49F1E78D0E}" type="datetimeFigureOut">
               <a:rPr lang="en-US" smtClean="0"/>
-              <a:t>8/5/2020</a:t>
+              <a:t>8/8/2020</a:t>
             </a:fld>
             <a:endParaRPr lang="en-US"/>
           </a:p>
@@ -1821,7 +1824,7 @@
           <a:p>
             <a:fld id="{CBD5BFB6-D87F-42FC-8428-4A49F1E78D0E}" type="datetimeFigureOut">
               <a:rPr lang="en-US" smtClean="0"/>
-              <a:t>8/5/2020</a:t>
+              <a:t>8/8/2020</a:t>
             </a:fld>
             <a:endParaRPr lang="en-US"/>
           </a:p>
@@ -1962,7 +1965,7 @@
           <a:p>
             <a:fld id="{CBD5BFB6-D87F-42FC-8428-4A49F1E78D0E}" type="datetimeFigureOut">
               <a:rPr lang="en-US" smtClean="0"/>
-              <a:t>8/5/2020</a:t>
+              <a:t>8/8/2020</a:t>
             </a:fld>
             <a:endParaRPr lang="en-US"/>
           </a:p>
@@ -2075,7 +2078,7 @@
           <a:p>
             <a:fld id="{CBD5BFB6-D87F-42FC-8428-4A49F1E78D0E}" type="datetimeFigureOut">
               <a:rPr lang="en-US" smtClean="0"/>
-              <a:t>8/5/2020</a:t>
+              <a:t>8/8/2020</a:t>
             </a:fld>
             <a:endParaRPr lang="en-US"/>
           </a:p>
@@ -2386,7 +2389,7 @@
           <a:p>
             <a:fld id="{CBD5BFB6-D87F-42FC-8428-4A49F1E78D0E}" type="datetimeFigureOut">
               <a:rPr lang="en-US" smtClean="0"/>
-              <a:t>8/5/2020</a:t>
+              <a:t>8/8/2020</a:t>
             </a:fld>
             <a:endParaRPr lang="en-US"/>
           </a:p>
@@ -2674,7 +2677,7 @@
           <a:p>
             <a:fld id="{CBD5BFB6-D87F-42FC-8428-4A49F1E78D0E}" type="datetimeFigureOut">
               <a:rPr lang="en-US" smtClean="0"/>
-              <a:t>8/5/2020</a:t>
+              <a:t>8/8/2020</a:t>
             </a:fld>
             <a:endParaRPr lang="en-US"/>
           </a:p>
@@ -2915,7 +2918,7 @@
           <a:p>
             <a:fld id="{CBD5BFB6-D87F-42FC-8428-4A49F1E78D0E}" type="datetimeFigureOut">
               <a:rPr lang="en-US" smtClean="0"/>
-              <a:t>8/5/2020</a:t>
+              <a:t>8/8/2020</a:t>
             </a:fld>
             <a:endParaRPr lang="en-US"/>
           </a:p>
@@ -3438,6 +3441,152 @@
 </p:sld>
 </file>
 
+<file path=ppt/slides/slide10.xml><?xml version="1.0" encoding="utf-8"?>
+<p:sld xmlns:a="http://schemas.openxmlformats.org/drawingml/2006/main" xmlns:r="http://schemas.openxmlformats.org/officeDocument/2006/relationships" xmlns:p="http://schemas.openxmlformats.org/presentationml/2006/main">
+  <p:cSld>
+    <p:spTree>
+      <p:nvGrpSpPr>
+        <p:cNvPr id="1" name=""/>
+        <p:cNvGrpSpPr/>
+        <p:nvPr/>
+      </p:nvGrpSpPr>
+      <p:grpSpPr>
+        <a:xfrm>
+          <a:off x="0" y="0"/>
+          <a:ext cx="0" cy="0"/>
+          <a:chOff x="0" y="0"/>
+          <a:chExt cx="0" cy="0"/>
+        </a:xfrm>
+      </p:grpSpPr>
+      <p:sp>
+        <p:nvSpPr>
+          <p:cNvPr id="2" name="Title 1">
+            <a:extLst>
+              <a:ext uri="{FF2B5EF4-FFF2-40B4-BE49-F238E27FC236}">
+                <a16:creationId xmlns:a16="http://schemas.microsoft.com/office/drawing/2014/main" id="{87063261-9E41-4146-AB27-A1C75FCBC73D}"/>
+              </a:ext>
+            </a:extLst>
+          </p:cNvPr>
+          <p:cNvSpPr>
+            <a:spLocks noGrp="1"/>
+          </p:cNvSpPr>
+          <p:nvPr>
+            <p:ph type="title"/>
+          </p:nvPr>
+        </p:nvSpPr>
+        <p:spPr/>
+        <p:txBody>
+          <a:bodyPr/>
+          <a:lstStyle/>
+          <a:p>
+            <a:r>
+              <a:rPr lang="en-US" dirty="0"/>
+              <a:t>Public Companies on </a:t>
+            </a:r>
+            <a:r>
+              <a:rPr lang="en-US" dirty="0" err="1"/>
+              <a:t>Natotis</a:t>
+            </a:r>
+            <a:endParaRPr lang="en-US" dirty="0"/>
+          </a:p>
+        </p:txBody>
+      </p:sp>
+      <p:sp>
+        <p:nvSpPr>
+          <p:cNvPr id="3" name="Content Placeholder 2">
+            <a:extLst>
+              <a:ext uri="{FF2B5EF4-FFF2-40B4-BE49-F238E27FC236}">
+                <a16:creationId xmlns:a16="http://schemas.microsoft.com/office/drawing/2014/main" id="{962D916B-1942-4EB0-92B6-0BFB86D92BDE}"/>
+              </a:ext>
+            </a:extLst>
+          </p:cNvPr>
+          <p:cNvSpPr>
+            <a:spLocks noGrp="1"/>
+          </p:cNvSpPr>
+          <p:nvPr>
+            <p:ph idx="1"/>
+          </p:nvPr>
+        </p:nvSpPr>
+        <p:spPr/>
+        <p:txBody>
+          <a:bodyPr/>
+          <a:lstStyle/>
+          <a:p>
+            <a:r>
+              <a:rPr lang="en-US" sz="1800" dirty="0" err="1">
+                <a:latin typeface="Consolas" panose="020B0609020204030204" pitchFamily="49" charset="0"/>
+              </a:rPr>
+              <a:t>Zhul</a:t>
+            </a:r>
+            <a:r>
+              <a:rPr lang="en-US" sz="1800" dirty="0">
+                <a:latin typeface="Consolas" panose="020B0609020204030204" pitchFamily="49" charset="0"/>
+              </a:rPr>
+              <a:t> Shuttle Co.   ZZZL</a:t>
+            </a:r>
+          </a:p>
+          <a:p>
+            <a:r>
+              <a:rPr lang="en-US" sz="1800" dirty="0" err="1">
+                <a:latin typeface="Consolas" panose="020B0609020204030204" pitchFamily="49" charset="0"/>
+              </a:rPr>
+              <a:t>Epsolon</a:t>
+            </a:r>
+            <a:r>
+              <a:rPr lang="en-US" sz="1800" dirty="0">
+                <a:latin typeface="Consolas" panose="020B0609020204030204" pitchFamily="49" charset="0"/>
+              </a:rPr>
+              <a:t> Motor Co.  EMC</a:t>
+            </a:r>
+          </a:p>
+          <a:p>
+            <a:r>
+              <a:rPr lang="en-US" sz="1800" dirty="0">
+                <a:latin typeface="Consolas" panose="020B0609020204030204" pitchFamily="49" charset="0"/>
+              </a:rPr>
+              <a:t>Crude Helium        CLL</a:t>
+            </a:r>
+          </a:p>
+          <a:p>
+            <a:r>
+              <a:rPr lang="en-US" sz="1800" dirty="0">
+                <a:latin typeface="Consolas" panose="020B0609020204030204" pitchFamily="49" charset="0"/>
+              </a:rPr>
+              <a:t>Tablet Retailers    TRKL</a:t>
+            </a:r>
+            <a:endParaRPr lang="en-US" sz="1800" dirty="0">
+              <a:solidFill>
+                <a:srgbClr val="800000"/>
+              </a:solidFill>
+              <a:latin typeface="Consolas" panose="020B0609020204030204" pitchFamily="49" charset="0"/>
+            </a:endParaRPr>
+          </a:p>
+          <a:p>
+            <a:r>
+              <a:rPr lang="en-US" sz="1800" dirty="0">
+                <a:latin typeface="Consolas" panose="020B0609020204030204" pitchFamily="49" charset="0"/>
+              </a:rPr>
+              <a:t>Valkyrie Intelligence VLG</a:t>
+            </a:r>
+          </a:p>
+          <a:p>
+            <a:endParaRPr lang="en-US" dirty="0"/>
+          </a:p>
+        </p:txBody>
+      </p:sp>
+    </p:spTree>
+    <p:extLst>
+      <p:ext uri="{BB962C8B-B14F-4D97-AF65-F5344CB8AC3E}">
+        <p14:creationId xmlns:p14="http://schemas.microsoft.com/office/powerpoint/2010/main" val="3425427593"/>
+      </p:ext>
+    </p:extLst>
+  </p:cSld>
+  <p:clrMapOvr>
+    <a:masterClrMapping/>
+  </p:clrMapOvr>
+</p:sld>
+</file>
+
 <file path=ppt/slides/slide2.xml><?xml version="1.0" encoding="utf-8"?>
 <p:sld xmlns:a="http://schemas.openxmlformats.org/drawingml/2006/main" xmlns:r="http://schemas.openxmlformats.org/officeDocument/2006/relationships" xmlns:p="http://schemas.openxmlformats.org/presentationml/2006/main">
   <p:cSld>
@@ -4228,7 +4377,31 @@
           <a:p>
             <a:r>
               <a:rPr lang="en-US" dirty="0"/>
-              <a:t>Supply</a:t>
+              <a:t>Supply the </a:t>
+            </a:r>
+            <a:r>
+              <a:rPr lang="en-US" dirty="0" err="1"/>
+              <a:t>Vurik</a:t>
+            </a:r>
+            <a:r>
+              <a:rPr lang="en-US" dirty="0"/>
+              <a:t> resistance that is operating in the </a:t>
+            </a:r>
+            <a:r>
+              <a:rPr lang="en-US" dirty="0" err="1"/>
+              <a:t>epsolon</a:t>
+            </a:r>
+            <a:r>
+              <a:rPr lang="en-US" dirty="0"/>
+              <a:t> warehouse in </a:t>
+            </a:r>
+            <a:r>
+              <a:rPr lang="en-US" dirty="0" err="1"/>
+              <a:t>Xigow</a:t>
+            </a:r>
+            <a:r>
+              <a:rPr lang="en-US" dirty="0"/>
+              <a:t>. </a:t>
             </a:r>
           </a:p>
           <a:p>
@@ -4274,7 +4447,7 @@
           <p:cNvPr id="2" name="Title 1">
             <a:extLst>
               <a:ext uri="{FF2B5EF4-FFF2-40B4-BE49-F238E27FC236}">
-                <a16:creationId xmlns:a16="http://schemas.microsoft.com/office/drawing/2014/main" id="{87063261-9E41-4146-AB27-A1C75FCBC73D}"/>
+                <a16:creationId xmlns:a16="http://schemas.microsoft.com/office/drawing/2014/main" id="{51CF9607-D785-4B35-AC8B-C15667E6D053}"/>
               </a:ext>
             </a:extLst>
           </p:cNvPr>
@@ -4290,15 +4463,14 @@
           <a:bodyPr/>
           <a:lstStyle/>
           <a:p>
-            <a:r>
-              <a:rPr lang="en-US" dirty="0"/>
-              <a:t>Public Companies on </a:t>
-            </a:r>
             <a:r>
               <a:rPr lang="en-US" dirty="0" err="1"/>
               <a:t>Natotis</a:t>
             </a:r>
-            <a:endParaRPr lang="en-US" dirty="0"/>
+            <a:r>
+              <a:rPr lang="en-US" dirty="0"/>
+              <a:t>: Warehouse Missions(Rep&lt;-20) </a:t>
+            </a:r>
           </a:p>
         </p:txBody>
       </p:sp>
@@ -4307,7 +4479,7 @@
           <p:cNvPr id="3" name="Content Placeholder 2">
             <a:extLst>
               <a:ext uri="{FF2B5EF4-FFF2-40B4-BE49-F238E27FC236}">
-                <a16:creationId xmlns:a16="http://schemas.microsoft.com/office/drawing/2014/main" id="{962D916B-1942-4EB0-92B6-0BFB86D92BDE}"/>
+                <a16:creationId xmlns:a16="http://schemas.microsoft.com/office/drawing/2014/main" id="{FC8BC3EC-4C50-4BD2-8CC4-78FD174D901B}"/>
               </a:ext>
             </a:extLst>
           </p:cNvPr>
@@ -4324,71 +4496,221 @@
           <a:lstStyle/>
           <a:p>
             <a:r>
-              <a:rPr lang="en-US" sz="1800" dirty="0" err="1">
-                <a:latin typeface="Consolas" panose="020B0609020204030204" pitchFamily="49" charset="0"/>
-              </a:rPr>
+              <a:rPr lang="en-US" dirty="0" err="1"/>
               <a:t>Zhul</a:t>
             </a:r>
             <a:r>
-              <a:rPr lang="en-US" sz="1800" dirty="0">
-                <a:latin typeface="Consolas" panose="020B0609020204030204" pitchFamily="49" charset="0"/>
-              </a:rPr>
-              <a:t> Shuttle Co.   ZZZL</a:t>
-            </a:r>
-          </a:p>
-          <a:p>
-            <a:r>
-              <a:rPr lang="en-US" sz="1800" dirty="0" err="1">
-                <a:latin typeface="Consolas" panose="020B0609020204030204" pitchFamily="49" charset="0"/>
-              </a:rPr>
-              <a:t>Epsolon</a:t>
-            </a:r>
-            <a:r>
-              <a:rPr lang="en-US" sz="1800" dirty="0">
-                <a:latin typeface="Consolas" panose="020B0609020204030204" pitchFamily="49" charset="0"/>
-              </a:rPr>
-              <a:t> Motor Co.  EMC</a:t>
-            </a:r>
-          </a:p>
-          <a:p>
-            <a:r>
-              <a:rPr lang="en-US" sz="1800" dirty="0">
-                <a:latin typeface="Consolas" panose="020B0609020204030204" pitchFamily="49" charset="0"/>
-              </a:rPr>
-              <a:t>Crude Helium        CLL</a:t>
-            </a:r>
-          </a:p>
-          <a:p>
-            <a:r>
-              <a:rPr lang="en-US" sz="1800" dirty="0">
-                <a:latin typeface="Consolas" panose="020B0609020204030204" pitchFamily="49" charset="0"/>
-              </a:rPr>
-              <a:t>Tablet Retailers    TRKL</a:t>
-            </a:r>
-            <a:endParaRPr lang="en-US" sz="1800" dirty="0">
-              <a:solidFill>
-                <a:srgbClr val="800000"/>
-              </a:solidFill>
-              <a:latin typeface="Consolas" panose="020B0609020204030204" pitchFamily="49" charset="0"/>
-            </a:endParaRPr>
-          </a:p>
-          <a:p>
-            <a:r>
-              <a:rPr lang="en-US" sz="1800" dirty="0">
-                <a:latin typeface="Consolas" panose="020B0609020204030204" pitchFamily="49" charset="0"/>
-              </a:rPr>
-              <a:t>Valkyrie Intelligence VLG</a:t>
-            </a:r>
-          </a:p>
-          <a:p>
-            <a:endParaRPr lang="en-US" dirty="0"/>
+              <a:rPr lang="en-US" dirty="0"/>
+              <a:t> Shuttle</a:t>
+            </a:r>
+          </a:p>
+          <a:p>
+            <a:pPr lvl="1"/>
+            <a:r>
+              <a:rPr lang="en-US" dirty="0"/>
+              <a:t>Gain secrets from competitor</a:t>
+            </a:r>
+          </a:p>
+          <a:p>
+            <a:pPr lvl="1"/>
+            <a:r>
+              <a:rPr lang="en-US" dirty="0"/>
+              <a:t>Sabotage shipment of experimental hyperdrive engines</a:t>
+            </a:r>
+          </a:p>
+          <a:p>
+            <a:r>
+              <a:rPr lang="en-US" dirty="0"/>
+              <a:t>Crude Helium</a:t>
+            </a:r>
+          </a:p>
+          <a:p>
+            <a:pPr lvl="1"/>
+            <a:r>
+              <a:rPr lang="en-US" dirty="0"/>
+              <a:t>Convince </a:t>
+            </a:r>
           </a:p>
         </p:txBody>
       </p:sp>
     </p:spTree>
     <p:extLst>
       <p:ext uri="{BB962C8B-B14F-4D97-AF65-F5344CB8AC3E}">
-        <p14:creationId xmlns:p14="http://schemas.microsoft.com/office/powerpoint/2010/main" val="3425427593"/>
+        <p14:creationId xmlns:p14="http://schemas.microsoft.com/office/powerpoint/2010/main" val="3363125792"/>
+      </p:ext>
+    </p:extLst>
+  </p:cSld>
+  <p:clrMapOvr>
+    <a:masterClrMapping/>
+  </p:clrMapOvr>
+</p:sld>
+</file>
+
+<file path=ppt/slides/slide8.xml><?xml version="1.0" encoding="utf-8"?>
+<p:sld xmlns:a="http://schemas.openxmlformats.org/drawingml/2006/main" xmlns:r="http://schemas.openxmlformats.org/officeDocument/2006/relationships" xmlns:p="http://schemas.openxmlformats.org/presentationml/2006/main">
+  <p:cSld>
+    <p:spTree>
+      <p:nvGrpSpPr>
+        <p:cNvPr id="1" name=""/>
+        <p:cNvGrpSpPr/>
+        <p:nvPr/>
+      </p:nvGrpSpPr>
+      <p:grpSpPr>
+        <a:xfrm>
+          <a:off x="0" y="0"/>
+          <a:ext cx="0" cy="0"/>
+          <a:chOff x="0" y="0"/>
+          <a:chExt cx="0" cy="0"/>
+        </a:xfrm>
+      </p:grpSpPr>
+      <p:sp>
+        <p:nvSpPr>
+          <p:cNvPr id="2" name="Title 1">
+            <a:extLst>
+              <a:ext uri="{FF2B5EF4-FFF2-40B4-BE49-F238E27FC236}">
+                <a16:creationId xmlns:a16="http://schemas.microsoft.com/office/drawing/2014/main" id="{6B11CCC2-6003-4932-B63D-9E353D4F6A68}"/>
+              </a:ext>
+            </a:extLst>
+          </p:cNvPr>
+          <p:cNvSpPr>
+            <a:spLocks noGrp="1"/>
+          </p:cNvSpPr>
+          <p:nvPr>
+            <p:ph type="title"/>
+          </p:nvPr>
+        </p:nvSpPr>
+        <p:spPr/>
+        <p:txBody>
+          <a:bodyPr/>
+          <a:lstStyle/>
+          <a:p>
+            <a:r>
+              <a:rPr lang="en-US" dirty="0" err="1"/>
+              <a:t>Natotis</a:t>
+            </a:r>
+            <a:r>
+              <a:rPr lang="en-US" dirty="0"/>
+              <a:t>: Tech Missions</a:t>
+            </a:r>
+          </a:p>
+        </p:txBody>
+      </p:sp>
+      <p:sp>
+        <p:nvSpPr>
+          <p:cNvPr id="3" name="Content Placeholder 2">
+            <a:extLst>
+              <a:ext uri="{FF2B5EF4-FFF2-40B4-BE49-F238E27FC236}">
+                <a16:creationId xmlns:a16="http://schemas.microsoft.com/office/drawing/2014/main" id="{1F6FDBF1-97DA-4C3D-81E7-37DE985CE74D}"/>
+              </a:ext>
+            </a:extLst>
+          </p:cNvPr>
+          <p:cNvSpPr>
+            <a:spLocks noGrp="1"/>
+          </p:cNvSpPr>
+          <p:nvPr>
+            <p:ph idx="1"/>
+          </p:nvPr>
+        </p:nvSpPr>
+        <p:spPr/>
+        <p:txBody>
+          <a:bodyPr/>
+          <a:lstStyle/>
+          <a:p>
+            <a:endParaRPr lang="en-US"/>
+          </a:p>
+        </p:txBody>
+      </p:sp>
+    </p:spTree>
+    <p:extLst>
+      <p:ext uri="{BB962C8B-B14F-4D97-AF65-F5344CB8AC3E}">
+        <p14:creationId xmlns:p14="http://schemas.microsoft.com/office/powerpoint/2010/main" val="1862499323"/>
+      </p:ext>
+    </p:extLst>
+  </p:cSld>
+  <p:clrMapOvr>
+    <a:masterClrMapping/>
+  </p:clrMapOvr>
+</p:sld>
+</file>
+
+<file path=ppt/slides/slide9.xml><?xml version="1.0" encoding="utf-8"?>
+<p:sld xmlns:a="http://schemas.openxmlformats.org/drawingml/2006/main" xmlns:r="http://schemas.openxmlformats.org/officeDocument/2006/relationships" xmlns:p="http://schemas.openxmlformats.org/presentationml/2006/main">
+  <p:cSld>
+    <p:spTree>
+      <p:nvGrpSpPr>
+        <p:cNvPr id="1" name=""/>
+        <p:cNvGrpSpPr/>
+        <p:nvPr/>
+      </p:nvGrpSpPr>
+      <p:grpSpPr>
+        <a:xfrm>
+          <a:off x="0" y="0"/>
+          <a:ext cx="0" cy="0"/>
+          <a:chOff x="0" y="0"/>
+          <a:chExt cx="0" cy="0"/>
+        </a:xfrm>
+      </p:grpSpPr>
+      <p:sp>
+        <p:nvSpPr>
+          <p:cNvPr id="2" name="Title 1">
+            <a:extLst>
+              <a:ext uri="{FF2B5EF4-FFF2-40B4-BE49-F238E27FC236}">
+                <a16:creationId xmlns:a16="http://schemas.microsoft.com/office/drawing/2014/main" id="{D9B67BC7-CE82-4504-A392-F2E7FEB3BBCF}"/>
+              </a:ext>
+            </a:extLst>
+          </p:cNvPr>
+          <p:cNvSpPr>
+            <a:spLocks noGrp="1"/>
+          </p:cNvSpPr>
+          <p:nvPr>
+            <p:ph type="title"/>
+          </p:nvPr>
+        </p:nvSpPr>
+        <p:spPr/>
+        <p:txBody>
+          <a:bodyPr/>
+          <a:lstStyle/>
+          <a:p>
+            <a:r>
+              <a:rPr lang="en-US" dirty="0" err="1"/>
+              <a:t>Natotis</a:t>
+            </a:r>
+            <a:r>
+              <a:rPr lang="en-US" dirty="0"/>
+              <a:t>: Senate Missions (</a:t>
+            </a:r>
+          </a:p>
+        </p:txBody>
+      </p:sp>
+      <p:sp>
+        <p:nvSpPr>
+          <p:cNvPr id="3" name="Content Placeholder 2">
+            <a:extLst>
+              <a:ext uri="{FF2B5EF4-FFF2-40B4-BE49-F238E27FC236}">
+                <a16:creationId xmlns:a16="http://schemas.microsoft.com/office/drawing/2014/main" id="{6AB0BE92-E6D0-4EA9-A351-07194686A48F}"/>
+              </a:ext>
+            </a:extLst>
+          </p:cNvPr>
+          <p:cNvSpPr>
+            <a:spLocks noGrp="1"/>
+          </p:cNvSpPr>
+          <p:nvPr>
+            <p:ph idx="1"/>
+          </p:nvPr>
+        </p:nvSpPr>
+        <p:spPr/>
+        <p:txBody>
+          <a:bodyPr/>
+          <a:lstStyle/>
+          <a:p>
+            <a:endParaRPr lang="en-US" dirty="0"/>
+          </a:p>
+        </p:txBody>
+      </p:sp>
+    </p:spTree>
+    <p:extLst>
+      <p:ext uri="{BB962C8B-B14F-4D97-AF65-F5344CB8AC3E}">
+        <p14:creationId xmlns:p14="http://schemas.microsoft.com/office/powerpoint/2010/main" val="1955489464"/>
       </p:ext>
     </p:extLst>
   </p:cSld>

</xml_diff>